<commit_message>
[LEI] estrutura ppt começada
</commit_message>
<xml_diff>
--- a/LEI/apresentações/apresLEI.pptx
+++ b/LEI/apresentações/apresLEI.pptx
@@ -5,16 +5,17 @@
     <p:sldMasterId id="2147483648" r:id="rId1"/>
   </p:sldMasterIdLst>
   <p:notesMasterIdLst>
-    <p:notesMasterId r:id="rId9"/>
+    <p:notesMasterId r:id="rId10"/>
   </p:notesMasterIdLst>
   <p:sldIdLst>
     <p:sldId id="256" r:id="rId2"/>
     <p:sldId id="257" r:id="rId3"/>
     <p:sldId id="272" r:id="rId4"/>
-    <p:sldId id="273" r:id="rId5"/>
+    <p:sldId id="274" r:id="rId5"/>
     <p:sldId id="267" r:id="rId6"/>
-    <p:sldId id="266" r:id="rId7"/>
-    <p:sldId id="271" r:id="rId8"/>
+    <p:sldId id="275" r:id="rId7"/>
+    <p:sldId id="266" r:id="rId8"/>
+    <p:sldId id="271" r:id="rId9"/>
   </p:sldIdLst>
   <p:sldSz cx="9144000" cy="6858000" type="screen4x3"/>
   <p:notesSz cx="9144000" cy="6858000"/>
@@ -630,7 +631,7 @@
           <a:p>
             <a:fld id="{62C9FF69-D9AD-48B5-8D39-7AA42039F77D}" type="slidenum">
               <a:rPr lang="pt-PT" smtClean="0"/>
-              <a:t>7</a:t>
+              <a:t>8</a:t>
             </a:fld>
             <a:endParaRPr lang="pt-PT"/>
           </a:p>
@@ -2208,7 +2209,11 @@
           <a:bodyPr wrap="square" lIns="0" tIns="0" rIns="0" bIns="0" rtlCol="0"/>
           <a:lstStyle/>
           <a:p>
-            <a:endParaRPr/>
+            <a:endParaRPr dirty="0">
+              <a:solidFill>
+                <a:srgbClr val="FF0000"/>
+              </a:solidFill>
+            </a:endParaRPr>
           </a:p>
         </p:txBody>
       </p:sp>
@@ -2819,7 +2824,7 @@
         <p:spPr>
           <a:xfrm>
             <a:off x="762000" y="2910990"/>
-            <a:ext cx="2439327" cy="369332"/>
+            <a:ext cx="2570503" cy="369332"/>
           </a:xfrm>
           <a:prstGeom prst="rect">
             <a:avLst/>
@@ -2833,13 +2838,34 @@
           <a:lstStyle/>
           <a:p>
             <a:r>
-              <a:rPr lang="pt-PT" dirty="0" err="1"/>
+              <a:rPr lang="pt-PT" dirty="0" err="1">
+                <a:solidFill>
+                  <a:srgbClr val="FF0000"/>
+                </a:solidFill>
+              </a:rPr>
               <a:t>Bot</a:t>
             </a:r>
             <a:r>
-              <a:rPr lang="pt-PT" dirty="0"/>
-              <a:t> ícone : TODO</a:t>
-            </a:r>
+              <a:rPr lang="pt-PT" dirty="0">
+                <a:solidFill>
+                  <a:srgbClr val="FF0000"/>
+                </a:solidFill>
+              </a:rPr>
+              <a:t> ícone : TODO </a:t>
+            </a:r>
+            <a:r>
+              <a:rPr lang="pt-PT" dirty="0" err="1">
+                <a:solidFill>
+                  <a:srgbClr val="FF0000"/>
+                </a:solidFill>
+              </a:rPr>
+              <a:t>maybe</a:t>
+            </a:r>
+            <a:endParaRPr lang="pt-PT" dirty="0">
+              <a:solidFill>
+                <a:srgbClr val="FF0000"/>
+              </a:solidFill>
+            </a:endParaRPr>
           </a:p>
         </p:txBody>
       </p:sp>
@@ -3080,7 +3106,7 @@
         <p:spPr>
           <a:xfrm>
             <a:off x="655383" y="1624917"/>
-            <a:ext cx="2561590" cy="762000"/>
+            <a:ext cx="2561590" cy="766235"/>
           </a:xfrm>
           <a:prstGeom prst="rect">
             <a:avLst/>
@@ -3114,12 +3140,18 @@
                 <a:latin typeface="Arial"/>
                 <a:cs typeface="Arial"/>
               </a:rPr>
-              <a:t>Contextualização</a:t>
-            </a:r>
-            <a:endParaRPr sz="1650" dirty="0">
-              <a:latin typeface="Arial"/>
-              <a:cs typeface="Arial"/>
-            </a:endParaRPr>
+              <a:t>C</a:t>
+            </a:r>
+            <a:r>
+              <a:rPr lang="pt-PT" sz="1650" b="1" spc="40" dirty="0">
+                <a:solidFill>
+                  <a:srgbClr val="FFFFFF"/>
+                </a:solidFill>
+                <a:latin typeface="Arial"/>
+                <a:cs typeface="Arial"/>
+              </a:rPr>
+              <a:t>onceitos</a:t>
+            </a:r>
           </a:p>
           <a:p>
             <a:pPr marL="298450" indent="-285750">
@@ -3127,7 +3159,7 @@
                 <a:spcPct val="100000"/>
               </a:lnSpc>
               <a:spcBef>
-                <a:spcPts val="919"/>
+                <a:spcPts val="1015"/>
               </a:spcBef>
               <a:buFont typeface="Arial"/>
               <a:buChar char="•"/>
@@ -3144,7 +3176,7 @@
                 <a:latin typeface="Arial"/>
                 <a:cs typeface="Arial"/>
               </a:rPr>
-              <a:t>Exemplos</a:t>
+              <a:t>Motivação/Objetivos</a:t>
             </a:r>
             <a:endParaRPr sz="1650" dirty="0">
               <a:latin typeface="Arial"/>
@@ -3190,7 +3222,7 @@
                 <a:latin typeface="Arial"/>
                 <a:cs typeface="Arial"/>
               </a:rPr>
-              <a:t>Área de Conhecimento</a:t>
+              <a:t>Introdução</a:t>
             </a:r>
             <a:endParaRPr sz="1650" dirty="0">
               <a:latin typeface="Arial"/>
@@ -3771,7 +3803,7 @@
                 <a:latin typeface="Arial"/>
                 <a:cs typeface="Arial"/>
               </a:rPr>
-              <a:t>Gramática de Atributos</a:t>
+              <a:t>Desenvolvimento</a:t>
             </a:r>
             <a:endParaRPr sz="1650" dirty="0">
               <a:latin typeface="Arial"/>
@@ -3823,7 +3855,7 @@
                 <a:latin typeface="Arial"/>
                 <a:cs typeface="Arial"/>
               </a:rPr>
-              <a:t>Desenvolvimento da solução</a:t>
+              <a:t>D</a:t>
             </a:r>
           </a:p>
         </p:txBody>
@@ -4437,8 +4469,8 @@
         </p:nvSpPr>
         <p:spPr>
           <a:xfrm>
-            <a:off x="2590800" y="4343400"/>
-            <a:ext cx="2971800" cy="369332"/>
+            <a:off x="457200" y="2138065"/>
+            <a:ext cx="2209800" cy="369332"/>
           </a:xfrm>
           <a:prstGeom prst="rect">
             <a:avLst/>
@@ -4466,6 +4498,95 @@
           </a:p>
         </p:txBody>
       </p:sp>
+      <p:sp>
+        <p:nvSpPr>
+          <p:cNvPr id="2" name="Retângulo 1">
+            <a:extLst>
+              <a:ext uri="{FF2B5EF4-FFF2-40B4-BE49-F238E27FC236}">
+                <a16:creationId xmlns:a16="http://schemas.microsoft.com/office/drawing/2014/main" id="{9FFF2FE5-AEE6-460C-9133-F795294FB8DE}"/>
+              </a:ext>
+            </a:extLst>
+          </p:cNvPr>
+          <p:cNvSpPr/>
+          <p:nvPr/>
+        </p:nvSpPr>
+        <p:spPr>
+          <a:xfrm>
+            <a:off x="457200" y="2667000"/>
+            <a:ext cx="4572000" cy="923330"/>
+          </a:xfrm>
+          <a:prstGeom prst="rect">
+            <a:avLst/>
+          </a:prstGeom>
+        </p:spPr>
+        <p:txBody>
+          <a:bodyPr>
+            <a:spAutoFit/>
+          </a:bodyPr>
+          <a:lstStyle/>
+          <a:p>
+            <a:r>
+              <a:rPr lang="pt-PT" dirty="0"/>
+              <a:t>Um </a:t>
+            </a:r>
+            <a:r>
+              <a:rPr lang="pt-PT" i="1" dirty="0" err="1"/>
+              <a:t>Chatbot</a:t>
+            </a:r>
+            <a:r>
+              <a:rPr lang="pt-PT" dirty="0"/>
+              <a:t> é um programa desenvolvido com o objetivo de simular uma conversa com um utilizador.</a:t>
+            </a:r>
+          </a:p>
+        </p:txBody>
+      </p:sp>
+      <p:pic>
+        <p:nvPicPr>
+          <p:cNvPr id="1026" name="Picture 2" descr="Resultado de imagem para chatbot">
+            <a:extLst>
+              <a:ext uri="{FF2B5EF4-FFF2-40B4-BE49-F238E27FC236}">
+                <a16:creationId xmlns:a16="http://schemas.microsoft.com/office/drawing/2014/main" id="{56847837-4079-4B46-BA64-40696143EA4F}"/>
+              </a:ext>
+            </a:extLst>
+          </p:cNvPr>
+          <p:cNvPicPr>
+            <a:picLocks noChangeAspect="1" noChangeArrowheads="1"/>
+          </p:cNvPicPr>
+          <p:nvPr/>
+        </p:nvPicPr>
+        <p:blipFill>
+          <a:blip r:embed="rId2" cstate="print">
+            <a:extLst>
+              <a:ext uri="{28A0092B-C50C-407E-A947-70E740481C1C}">
+                <a14:useLocalDpi xmlns:a14="http://schemas.microsoft.com/office/drawing/2010/main" val="0"/>
+              </a:ext>
+            </a:extLst>
+          </a:blip>
+          <a:srcRect/>
+          <a:stretch>
+            <a:fillRect/>
+          </a:stretch>
+        </p:blipFill>
+        <p:spPr bwMode="auto">
+          <a:xfrm>
+            <a:off x="5638800" y="1524000"/>
+            <a:ext cx="2517878" cy="1676400"/>
+          </a:xfrm>
+          <a:prstGeom prst="rect">
+            <a:avLst/>
+          </a:prstGeom>
+          <a:noFill/>
+          <a:extLst>
+            <a:ext uri="{909E8E84-426E-40DD-AFC4-6F175D3DCCD1}">
+              <a14:hiddenFill xmlns:a14="http://schemas.microsoft.com/office/drawing/2010/main">
+                <a:solidFill>
+                  <a:srgbClr val="FFFFFF"/>
+                </a:solidFill>
+              </a14:hiddenFill>
+            </a:ext>
+          </a:extLst>
+        </p:spPr>
+      </p:pic>
     </p:spTree>
     <p:extLst>
       <p:ext uri="{BB962C8B-B14F-4D97-AF65-F5344CB8AC3E}">
@@ -4501,7 +4622,7 @@
           <p:cNvPr id="3" name="object 2">
             <a:extLst>
               <a:ext uri="{FF2B5EF4-FFF2-40B4-BE49-F238E27FC236}">
-                <a16:creationId xmlns:a16="http://schemas.microsoft.com/office/drawing/2014/main" id="{3EB6BBBB-4CF2-4397-82B3-8C6F575F4FE8}"/>
+                <a16:creationId xmlns:a16="http://schemas.microsoft.com/office/drawing/2014/main" id="{5538EF00-CAFD-4B22-A49E-27B33CD6D0A3}"/>
               </a:ext>
             </a:extLst>
           </p:cNvPr>
@@ -4514,8 +4635,8 @@
         </p:nvSpPr>
         <p:spPr>
           <a:xfrm>
-            <a:off x="3543300" y="228600"/>
-            <a:ext cx="2057400" cy="461023"/>
+            <a:off x="2790825" y="304800"/>
+            <a:ext cx="3562350" cy="461023"/>
           </a:xfrm>
           <a:prstGeom prst="rect">
             <a:avLst/>
@@ -4537,7 +4658,7 @@
             </a:pPr>
             <a:r>
               <a:rPr lang="pt-PT" spc="-185" dirty="0"/>
-              <a:t>Arquitetura</a:t>
+              <a:t>Motivação/Objetivos</a:t>
             </a:r>
             <a:endParaRPr spc="-185" dirty="0"/>
           </a:p>
@@ -4546,7 +4667,7 @@
     </p:spTree>
     <p:extLst>
       <p:ext uri="{BB962C8B-B14F-4D97-AF65-F5344CB8AC3E}">
-        <p14:creationId xmlns:p14="http://schemas.microsoft.com/office/powerpoint/2010/main" val="2538142247"/>
+        <p14:creationId xmlns:p14="http://schemas.microsoft.com/office/powerpoint/2010/main" val="2408551954"/>
       </p:ext>
     </p:extLst>
   </p:cSld>
@@ -4625,7 +4746,13 @@
       </p:sp>
       <p:sp>
         <p:nvSpPr>
-          <p:cNvPr id="5" name="object 5"/>
+          <p:cNvPr id="9" name="object 2">
+            <a:extLst>
+              <a:ext uri="{FF2B5EF4-FFF2-40B4-BE49-F238E27FC236}">
+                <a16:creationId xmlns:a16="http://schemas.microsoft.com/office/drawing/2014/main" id="{AE81FA02-C10F-482F-9ED4-F0FBBAFB14BD}"/>
+              </a:ext>
+            </a:extLst>
+          </p:cNvPr>
           <p:cNvSpPr txBox="1">
             <a:spLocks noGrp="1"/>
           </p:cNvSpPr>
@@ -4635,8 +4762,8 @@
         </p:nvSpPr>
         <p:spPr>
           <a:xfrm>
-            <a:off x="2686050" y="173054"/>
-            <a:ext cx="3771900" cy="461023"/>
+            <a:off x="3543300" y="228600"/>
+            <a:ext cx="2057400" cy="461023"/>
           </a:xfrm>
           <a:prstGeom prst="rect">
             <a:avLst/>
@@ -4657,18 +4784,173 @@
               </a:spcBef>
             </a:pPr>
             <a:r>
-              <a:rPr lang="pt-PT" spc="-130" dirty="0">
-                <a:solidFill>
-                  <a:srgbClr val="FFFFFF"/>
-                </a:solidFill>
-              </a:rPr>
-              <a:t>Gramática de Atributos</a:t>
-            </a:r>
-            <a:endParaRPr spc="-130" dirty="0">
+              <a:rPr lang="pt-PT" spc="-185" dirty="0">
+                <a:solidFill>
+                  <a:schemeClr val="bg1"/>
+                </a:solidFill>
+              </a:rPr>
+              <a:t>Arquitetura</a:t>
+            </a:r>
+            <a:endParaRPr spc="-185" dirty="0">
               <a:solidFill>
-                <a:srgbClr val="FFFFFF"/>
+                <a:schemeClr val="bg1"/>
               </a:solidFill>
             </a:endParaRPr>
+          </a:p>
+        </p:txBody>
+      </p:sp>
+      <p:pic>
+        <p:nvPicPr>
+          <p:cNvPr id="10" name="Imagem 9">
+            <a:extLst>
+              <a:ext uri="{FF2B5EF4-FFF2-40B4-BE49-F238E27FC236}">
+                <a16:creationId xmlns:a16="http://schemas.microsoft.com/office/drawing/2014/main" id="{08183A0A-DA67-4959-8478-175A12AF564E}"/>
+              </a:ext>
+            </a:extLst>
+          </p:cNvPr>
+          <p:cNvPicPr>
+            <a:picLocks noChangeAspect="1"/>
+          </p:cNvPicPr>
+          <p:nvPr/>
+        </p:nvPicPr>
+        <p:blipFill>
+          <a:blip r:embed="rId2">
+            <a:extLst>
+              <a:ext uri="{28A0092B-C50C-407E-A947-70E740481C1C}">
+                <a14:useLocalDpi xmlns:a14="http://schemas.microsoft.com/office/drawing/2010/main" val="0"/>
+              </a:ext>
+            </a:extLst>
+          </a:blip>
+          <a:stretch>
+            <a:fillRect/>
+          </a:stretch>
+        </p:blipFill>
+        <p:spPr>
+          <a:xfrm>
+            <a:off x="1497260" y="1219200"/>
+            <a:ext cx="6149480" cy="5562600"/>
+          </a:xfrm>
+          <a:prstGeom prst="rect">
+            <a:avLst/>
+          </a:prstGeom>
+        </p:spPr>
+      </p:pic>
+      <p:sp>
+        <p:nvSpPr>
+          <p:cNvPr id="11" name="CaixaDeTexto 10">
+            <a:extLst>
+              <a:ext uri="{FF2B5EF4-FFF2-40B4-BE49-F238E27FC236}">
+                <a16:creationId xmlns:a16="http://schemas.microsoft.com/office/drawing/2014/main" id="{998AA047-1179-4555-83A3-65588A133A4A}"/>
+              </a:ext>
+            </a:extLst>
+          </p:cNvPr>
+          <p:cNvSpPr txBox="1"/>
+          <p:nvPr/>
+        </p:nvSpPr>
+        <p:spPr>
+          <a:xfrm>
+            <a:off x="1295400" y="5029200"/>
+            <a:ext cx="4442320" cy="369332"/>
+          </a:xfrm>
+          <a:prstGeom prst="rect">
+            <a:avLst/>
+          </a:prstGeom>
+          <a:noFill/>
+        </p:spPr>
+        <p:txBody>
+          <a:bodyPr wrap="square" rtlCol="0">
+            <a:spAutoFit/>
+          </a:bodyPr>
+          <a:lstStyle/>
+          <a:p>
+            <a:r>
+              <a:rPr lang="pt-PT" dirty="0">
+                <a:solidFill>
+                  <a:srgbClr val="FF0000"/>
+                </a:solidFill>
+              </a:rPr>
+              <a:t>Precisa de um print melhor para isto</a:t>
+            </a:r>
+          </a:p>
+        </p:txBody>
+      </p:sp>
+    </p:spTree>
+    <p:extLst>
+      <p:ext uri="{BB962C8B-B14F-4D97-AF65-F5344CB8AC3E}">
+        <p14:creationId xmlns:p14="http://schemas.microsoft.com/office/powerpoint/2010/main" val="2610590006"/>
+      </p:ext>
+    </p:extLst>
+  </p:cSld>
+  <p:clrMapOvr>
+    <a:masterClrMapping/>
+  </p:clrMapOvr>
+</p:sld>
+</file>
+
+<file path=ppt/slides/slide6.xml><?xml version="1.0" encoding="utf-8"?>
+<p:sld xmlns:a="http://schemas.openxmlformats.org/drawingml/2006/main" xmlns:r="http://schemas.openxmlformats.org/officeDocument/2006/relationships" xmlns:p="http://schemas.openxmlformats.org/presentationml/2006/main">
+  <p:cSld>
+    <p:spTree>
+      <p:nvGrpSpPr>
+        <p:cNvPr id="1" name=""/>
+        <p:cNvGrpSpPr/>
+        <p:nvPr/>
+      </p:nvGrpSpPr>
+      <p:grpSpPr>
+        <a:xfrm>
+          <a:off x="0" y="0"/>
+          <a:ext cx="0" cy="0"/>
+          <a:chOff x="0" y="0"/>
+          <a:chExt cx="0" cy="0"/>
+        </a:xfrm>
+      </p:grpSpPr>
+      <p:sp>
+        <p:nvSpPr>
+          <p:cNvPr id="2" name="object 2"/>
+          <p:cNvSpPr/>
+          <p:nvPr/>
+        </p:nvSpPr>
+        <p:spPr>
+          <a:xfrm>
+            <a:off x="0" y="0"/>
+            <a:ext cx="9144000" cy="6858000"/>
+          </a:xfrm>
+          <a:custGeom>
+            <a:avLst/>
+            <a:gdLst/>
+            <a:ahLst/>
+            <a:cxnLst/>
+            <a:rect l="l" t="t" r="r" b="b"/>
+            <a:pathLst>
+              <a:path w="9144000" h="6858000">
+                <a:moveTo>
+                  <a:pt x="0" y="6857995"/>
+                </a:moveTo>
+                <a:lnTo>
+                  <a:pt x="9144000" y="6857995"/>
+                </a:lnTo>
+                <a:lnTo>
+                  <a:pt x="9144000" y="0"/>
+                </a:lnTo>
+                <a:lnTo>
+                  <a:pt x="0" y="0"/>
+                </a:lnTo>
+                <a:lnTo>
+                  <a:pt x="0" y="6857995"/>
+                </a:lnTo>
+                <a:close/>
+              </a:path>
+            </a:pathLst>
+          </a:custGeom>
+          <a:solidFill>
+            <a:srgbClr val="38505F"/>
+          </a:solidFill>
+        </p:spPr>
+        <p:txBody>
+          <a:bodyPr wrap="square" lIns="0" tIns="0" rIns="0" bIns="0" rtlCol="0"/>
+          <a:lstStyle/>
+          <a:p>
+            <a:endParaRPr dirty="0"/>
           </a:p>
         </p:txBody>
       </p:sp>
@@ -5653,7 +5935,7 @@
     </p:spTree>
     <p:extLst>
       <p:ext uri="{BB962C8B-B14F-4D97-AF65-F5344CB8AC3E}">
-        <p14:creationId xmlns:p14="http://schemas.microsoft.com/office/powerpoint/2010/main" val="2610590006"/>
+        <p14:creationId xmlns:p14="http://schemas.microsoft.com/office/powerpoint/2010/main" val="890682223"/>
       </p:ext>
     </p:extLst>
   </p:cSld>
@@ -5663,7 +5945,7 @@
 </p:sld>
 </file>
 
-<file path=ppt/slides/slide6.xml><?xml version="1.0" encoding="utf-8"?>
+<file path=ppt/slides/slide7.xml><?xml version="1.0" encoding="utf-8"?>
 <p:sld xmlns:a="http://schemas.openxmlformats.org/drawingml/2006/main" xmlns:r="http://schemas.openxmlformats.org/officeDocument/2006/relationships" xmlns:p="http://schemas.openxmlformats.org/presentationml/2006/main" showMasterSp="0">
   <p:cSld>
     <p:spTree>
@@ -5829,6 +6111,58 @@
           </a:p>
         </p:txBody>
       </p:sp>
+      <p:sp>
+        <p:nvSpPr>
+          <p:cNvPr id="5" name="Retângulo: Cantos Arredondados 4">
+            <a:extLst>
+              <a:ext uri="{FF2B5EF4-FFF2-40B4-BE49-F238E27FC236}">
+                <a16:creationId xmlns:a16="http://schemas.microsoft.com/office/drawing/2014/main" id="{B8336ACE-D0D5-489B-ACD7-457A46608889}"/>
+              </a:ext>
+            </a:extLst>
+          </p:cNvPr>
+          <p:cNvSpPr/>
+          <p:nvPr/>
+        </p:nvSpPr>
+        <p:spPr>
+          <a:xfrm>
+            <a:off x="338706" y="1294702"/>
+            <a:ext cx="8420100" cy="4191000"/>
+          </a:xfrm>
+          <a:prstGeom prst="roundRect">
+            <a:avLst/>
+          </a:prstGeom>
+          <a:solidFill>
+            <a:srgbClr val="DDDDDD"/>
+          </a:solidFill>
+          <a:ln>
+            <a:noFill/>
+          </a:ln>
+        </p:spPr>
+        <p:style>
+          <a:lnRef idx="2">
+            <a:schemeClr val="accent1">
+              <a:shade val="50000"/>
+            </a:schemeClr>
+          </a:lnRef>
+          <a:fillRef idx="1">
+            <a:schemeClr val="accent1"/>
+          </a:fillRef>
+          <a:effectRef idx="0">
+            <a:schemeClr val="accent1"/>
+          </a:effectRef>
+          <a:fontRef idx="minor">
+            <a:schemeClr val="lt1"/>
+          </a:fontRef>
+        </p:style>
+        <p:txBody>
+          <a:bodyPr rtlCol="0" anchor="ctr"/>
+          <a:lstStyle/>
+          <a:p>
+            <a:pPr algn="ctr"/>
+            <a:endParaRPr lang="pt-PT"/>
+          </a:p>
+        </p:txBody>
+      </p:sp>
     </p:spTree>
   </p:cSld>
   <p:clrMapOvr>
@@ -5837,7 +6171,7 @@
 </p:sld>
 </file>
 
-<file path=ppt/slides/slide7.xml><?xml version="1.0" encoding="utf-8"?>
+<file path=ppt/slides/slide8.xml><?xml version="1.0" encoding="utf-8"?>
 <p:sld xmlns:a="http://schemas.openxmlformats.org/drawingml/2006/main" xmlns:r="http://schemas.openxmlformats.org/officeDocument/2006/relationships" xmlns:p="http://schemas.openxmlformats.org/presentationml/2006/main">
   <p:cSld>
     <p:spTree>

</xml_diff>

<commit_message>
[LEI] notas do kiko
</commit_message>
<xml_diff>
--- a/LEI/apresentações/apresLEI.pptx
+++ b/LEI/apresentações/apresLEI.pptx
@@ -532,6 +532,44 @@
               <a:t>KIKO</a:t>
             </a:r>
           </a:p>
+          <a:p>
+            <a:r>
+              <a:rPr lang="pt-PT" b="1" u="sng" dirty="0"/>
+              <a:t>Bom dia!!!</a:t>
+            </a:r>
+          </a:p>
+          <a:p>
+            <a:r>
+              <a:rPr lang="pt-PT" dirty="0"/>
+              <a:t>Eu sou o Francisco, este é o Raul, e esta é a Diana e vamos começar a nossa apresentação do </a:t>
+            </a:r>
+            <a:r>
+              <a:rPr lang="pt-PT" u="sng" dirty="0"/>
+              <a:t>projeto de Laboratórios de Engenharia Informática</a:t>
+            </a:r>
+            <a:r>
+              <a:rPr lang="pt-PT" dirty="0"/>
+              <a:t>.</a:t>
+            </a:r>
+          </a:p>
+          <a:p>
+            <a:r>
+              <a:rPr lang="pt-PT" dirty="0"/>
+              <a:t>O tema do projeto é uma </a:t>
+            </a:r>
+            <a:r>
+              <a:rPr lang="pt-PT" b="1" u="sng" dirty="0"/>
+              <a:t>“DSL para geração de </a:t>
+            </a:r>
+            <a:r>
+              <a:rPr lang="pt-PT" b="1" u="sng" dirty="0" err="1"/>
+              <a:t>ChatBots</a:t>
+            </a:r>
+            <a:r>
+              <a:rPr lang="pt-PT" b="1" u="sng" dirty="0"/>
+              <a:t>”</a:t>
+            </a:r>
+          </a:p>
         </p:txBody>
       </p:sp>
       <p:sp>
@@ -619,6 +657,110 @@
               <a:t>KIKO</a:t>
             </a:r>
           </a:p>
+          <a:p>
+            <a:r>
+              <a:rPr lang="pt-PT" dirty="0"/>
+              <a:t>Aqui temos a estrutura da apresentação!</a:t>
+            </a:r>
+          </a:p>
+          <a:p>
+            <a:r>
+              <a:rPr lang="pt-PT" dirty="0"/>
+              <a:t>Vamos iniciar com uma </a:t>
+            </a:r>
+            <a:r>
+              <a:rPr lang="pt-PT" u="sng" dirty="0"/>
+              <a:t>INTRODUÇÃO</a:t>
+            </a:r>
+            <a:r>
+              <a:rPr lang="pt-PT" dirty="0"/>
+              <a:t> indicando alguns Conceitos, e marcando alguns </a:t>
+            </a:r>
+            <a:r>
+              <a:rPr lang="pt-PT" b="1" u="none" dirty="0"/>
+              <a:t>Objetivos e Motivações </a:t>
+            </a:r>
+            <a:r>
+              <a:rPr lang="pt-PT" dirty="0"/>
+              <a:t>deste projeto.</a:t>
+            </a:r>
+          </a:p>
+          <a:p>
+            <a:r>
+              <a:rPr lang="pt-PT" dirty="0"/>
+              <a:t>De seguida vamos </a:t>
+            </a:r>
+            <a:r>
+              <a:rPr lang="pt-PT" u="sng" dirty="0"/>
+              <a:t>DESENVOLVER</a:t>
+            </a:r>
+            <a:r>
+              <a:rPr lang="pt-PT" dirty="0"/>
+              <a:t> um pouco a </a:t>
+            </a:r>
+            <a:r>
+              <a:rPr lang="pt-PT" b="1" dirty="0"/>
+              <a:t>DSL</a:t>
+            </a:r>
+            <a:r>
+              <a:rPr lang="pt-PT" dirty="0"/>
+              <a:t> e falar sobre ela, bem como o </a:t>
+            </a:r>
+            <a:r>
+              <a:rPr lang="pt-PT" b="1" dirty="0"/>
+              <a:t>Funcionamento Interno </a:t>
+            </a:r>
+            <a:r>
+              <a:rPr lang="pt-PT" dirty="0"/>
+              <a:t>genérico de um BOT</a:t>
+            </a:r>
+          </a:p>
+          <a:p>
+            <a:r>
+              <a:rPr lang="pt-PT" dirty="0"/>
+              <a:t>Finalmente vamos mostrar </a:t>
+            </a:r>
+            <a:r>
+              <a:rPr lang="pt-PT" u="sng" dirty="0"/>
+              <a:t>RESULTADOS</a:t>
+            </a:r>
+            <a:r>
+              <a:rPr lang="pt-PT" dirty="0"/>
+              <a:t> com um breve </a:t>
+            </a:r>
+            <a:r>
+              <a:rPr lang="pt-PT" b="1" dirty="0"/>
+              <a:t>Demo</a:t>
+            </a:r>
+            <a:r>
+              <a:rPr lang="pt-PT" dirty="0"/>
+              <a:t> de interação entre um </a:t>
+            </a:r>
+            <a:r>
+              <a:rPr lang="pt-PT" b="1" dirty="0" err="1"/>
+              <a:t>User</a:t>
+            </a:r>
+            <a:r>
+              <a:rPr lang="pt-PT" b="1" dirty="0"/>
+              <a:t> e os </a:t>
+            </a:r>
+            <a:r>
+              <a:rPr lang="pt-PT" b="1" dirty="0" err="1"/>
+              <a:t>Bots</a:t>
+            </a:r>
+            <a:r>
+              <a:rPr lang="pt-PT" dirty="0"/>
+              <a:t>, e terminamos com referencias a </a:t>
+            </a:r>
+            <a:r>
+              <a:rPr lang="pt-PT" b="1" dirty="0"/>
+              <a:t>Trabalho Futuro </a:t>
+            </a:r>
+            <a:r>
+              <a:rPr lang="pt-PT" dirty="0"/>
+              <a:t>e melhoramentos que temos planeados.</a:t>
+            </a:r>
+          </a:p>
         </p:txBody>
       </p:sp>
       <p:sp>
@@ -1141,6 +1283,110 @@
               <a:t>KIKO</a:t>
             </a:r>
           </a:p>
+          <a:p>
+            <a:r>
+              <a:rPr lang="pt-PT" dirty="0"/>
+              <a:t>Quanto ao Trabalho Futuro, temos como objetivos: </a:t>
+            </a:r>
+          </a:p>
+          <a:p>
+            <a:pPr marL="171450" indent="-171450">
+              <a:buFont typeface="Arial" panose="020B0604020202020204" pitchFamily="34" charset="0"/>
+              <a:buChar char="•"/>
+            </a:pPr>
+            <a:r>
+              <a:rPr lang="pt-PT" dirty="0"/>
+              <a:t>Permitir especificar na DSL, </a:t>
+            </a:r>
+            <a:r>
+              <a:rPr lang="pt-PT" u="sng" dirty="0"/>
+              <a:t>Prioridades e Categorias </a:t>
+            </a:r>
+            <a:r>
+              <a:rPr lang="pt-PT" dirty="0"/>
+              <a:t>(</a:t>
+            </a:r>
+            <a:r>
+              <a:rPr lang="pt-PT" dirty="0" err="1"/>
+              <a:t>etc</a:t>
+            </a:r>
+            <a:r>
+              <a:rPr lang="pt-PT" dirty="0"/>
+              <a:t>, caraterísticas) para cada BOT aumentando a capacidade de </a:t>
+            </a:r>
+            <a:r>
+              <a:rPr lang="pt-PT" b="1" dirty="0"/>
+              <a:t>personalização do sistema</a:t>
+            </a:r>
+          </a:p>
+          <a:p>
+            <a:pPr marL="171450" indent="-171450">
+              <a:buFont typeface="Arial" panose="020B0604020202020204" pitchFamily="34" charset="0"/>
+              <a:buChar char="•"/>
+            </a:pPr>
+            <a:r>
+              <a:rPr lang="pt-PT" dirty="0"/>
+              <a:t>Aumentar a capacidade de  </a:t>
+            </a:r>
+            <a:r>
+              <a:rPr lang="pt-PT" u="sng" dirty="0"/>
+              <a:t>Aprendizagem do BOT</a:t>
+            </a:r>
+            <a:r>
+              <a:rPr lang="pt-PT" dirty="0"/>
+              <a:t>, através da analise do </a:t>
+            </a:r>
+            <a:r>
+              <a:rPr lang="pt-PT" b="1" dirty="0"/>
+              <a:t>utilizador (perfil, preferências) </a:t>
+            </a:r>
+            <a:r>
+              <a:rPr lang="pt-PT" dirty="0"/>
+              <a:t>ou até mesmo por aprendizagem com </a:t>
+            </a:r>
+            <a:r>
+              <a:rPr lang="pt-PT" b="1" dirty="0"/>
+              <a:t>diálogos (utilizador, excertos filmes)</a:t>
+            </a:r>
+          </a:p>
+          <a:p>
+            <a:pPr marL="171450" indent="-171450">
+              <a:buFont typeface="Arial" panose="020B0604020202020204" pitchFamily="34" charset="0"/>
+              <a:buChar char="•"/>
+            </a:pPr>
+            <a:r>
+              <a:rPr lang="pt-PT" u="sng" dirty="0"/>
+              <a:t>Guardar estados/informação recente </a:t>
+            </a:r>
+            <a:r>
+              <a:rPr lang="pt-PT" dirty="0"/>
+              <a:t>que permitam um </a:t>
+            </a:r>
+            <a:r>
+              <a:rPr lang="pt-PT" b="1" dirty="0"/>
+              <a:t>melhor e mais </a:t>
+            </a:r>
+            <a:r>
+              <a:rPr lang="pt-PT" b="1" u="none" dirty="0"/>
+              <a:t>fluido</a:t>
+            </a:r>
+            <a:r>
+              <a:rPr lang="pt-PT" b="1" dirty="0"/>
+              <a:t> dialogo </a:t>
+            </a:r>
+            <a:r>
+              <a:rPr lang="pt-PT" dirty="0"/>
+              <a:t>com o </a:t>
+            </a:r>
+            <a:r>
+              <a:rPr lang="pt-PT" b="1" dirty="0"/>
+              <a:t>utilizador</a:t>
+            </a:r>
+            <a:r>
+              <a:rPr lang="pt-PT" dirty="0"/>
+              <a:t> (exemplo???)</a:t>
+            </a:r>
+          </a:p>
         </p:txBody>
       </p:sp>
       <p:sp>
@@ -1223,7 +1469,38 @@
           <a:bodyPr/>
           <a:lstStyle/>
           <a:p>
-            <a:endParaRPr lang="pt-PT" dirty="0"/>
+            <a:r>
+              <a:rPr lang="pt-PT" dirty="0"/>
+              <a:t>KIKO</a:t>
+            </a:r>
+          </a:p>
+          <a:p>
+            <a:r>
+              <a:rPr lang="pt-PT" dirty="0"/>
+              <a:t>Assim terminamos a nossa apresentação, não sei se existe alguma duvida… . .</a:t>
+            </a:r>
+          </a:p>
+          <a:p>
+            <a:r>
+              <a:rPr lang="pt-PT" i="1" dirty="0"/>
+              <a:t>Não? </a:t>
+            </a:r>
+            <a:r>
+              <a:rPr lang="pt-PT" dirty="0"/>
+              <a:t>Ok então por nós é tudo :D XD </a:t>
+            </a:r>
+          </a:p>
+          <a:p>
+            <a:r>
+              <a:rPr lang="pt-PT" dirty="0"/>
+              <a:t>Muito obrigado</a:t>
+            </a:r>
+          </a:p>
+          <a:p>
+            <a:r>
+              <a:rPr lang="pt-PT" b="1" dirty="0"/>
+              <a:t>PEACEEEEE</a:t>
+            </a:r>
           </a:p>
         </p:txBody>
       </p:sp>
@@ -4671,8 +4948,8 @@
         </p:nvSpPr>
         <p:spPr>
           <a:xfrm>
-            <a:off x="5105400" y="2869684"/>
-            <a:ext cx="2996302" cy="1530547"/>
+            <a:off x="5105400" y="2970005"/>
+            <a:ext cx="2996302" cy="1148391"/>
           </a:xfrm>
           <a:prstGeom prst="rect">
             <a:avLst/>
@@ -4683,32 +4960,6 @@
             <a:spAutoFit/>
           </a:bodyPr>
           <a:lstStyle/>
-          <a:p>
-            <a:pPr marL="298450" indent="-285750" algn="just">
-              <a:lnSpc>
-                <a:spcPct val="100000"/>
-              </a:lnSpc>
-              <a:spcBef>
-                <a:spcPts val="1015"/>
-              </a:spcBef>
-              <a:buFont typeface="Arial"/>
-              <a:buChar char="•"/>
-              <a:tabLst>
-                <a:tab pos="297815" algn="l"/>
-                <a:tab pos="298450" algn="l"/>
-              </a:tabLst>
-            </a:pPr>
-            <a:r>
-              <a:rPr lang="pt-PT" sz="1650" b="1" spc="10" dirty="0">
-                <a:solidFill>
-                  <a:schemeClr val="bg1"/>
-                </a:solidFill>
-                <a:latin typeface="Arial"/>
-                <a:cs typeface="Arial"/>
-              </a:rPr>
-              <a:t>Expressões Regulares</a:t>
-            </a:r>
-          </a:p>
           <a:p>
             <a:pPr marL="298450" indent="-285750" algn="just">
               <a:lnSpc>
@@ -8223,14 +8474,21 @@
               <a:t>userInput</a:t>
             </a:r>
             <a:r>
-              <a:rPr lang="pt-PT" sz="1700" dirty="0">
+              <a:rPr lang="pt-PT" sz="1700" dirty="0" err="1">
+                <a:latin typeface="Consolas" panose="020B0609020204030204" pitchFamily="49" charset="0"/>
+                <a:cs typeface="Arial" panose="020B0604020202020204" pitchFamily="34" charset="0"/>
+              </a:rPr>
+              <a:t>,</a:t>
+            </a:r>
+            <a:r>
+              <a:rPr lang="pt-PT" sz="1700" dirty="0" err="1">
                 <a:solidFill>
                   <a:srgbClr val="488ED4"/>
                 </a:solidFill>
                 <a:latin typeface="Consolas" panose="020B0609020204030204" pitchFamily="49" charset="0"/>
                 <a:cs typeface="Arial" panose="020B0604020202020204" pitchFamily="34" charset="0"/>
               </a:rPr>
-              <a:t> , regras</a:t>
+              <a:t>regras</a:t>
             </a:r>
             <a:r>
               <a:rPr lang="pt-PT" sz="1700" dirty="0">
@@ -9080,7 +9338,7 @@
                 <a:latin typeface="Consolas" panose="020B0609020204030204" pitchFamily="49" charset="0"/>
                 <a:cs typeface="Segoe UI" panose="020B0502040204020203" pitchFamily="34" charset="0"/>
               </a:rPr>
-              <a:t>: O meu livro preferido é </a:t>
+              <a:t>: O meu livro preferido é A Arte de Insultar. </a:t>
             </a:r>
             <a:r>
               <a:rPr lang="pt-PT" sz="1700" u="sng" dirty="0">
@@ -9090,7 +9348,7 @@
                 <a:latin typeface="Consolas" panose="020B0609020204030204" pitchFamily="49" charset="0"/>
                 <a:cs typeface="Segoe UI" panose="020B0502040204020203" pitchFamily="34" charset="0"/>
               </a:rPr>
-              <a:t>A Arte de Insultar</a:t>
+              <a:t>Conheces</a:t>
             </a:r>
             <a:r>
               <a:rPr lang="pt-PT" sz="1700" dirty="0">
@@ -9100,7 +9358,7 @@
                 <a:latin typeface="Consolas" panose="020B0609020204030204" pitchFamily="49" charset="0"/>
                 <a:cs typeface="Segoe UI" panose="020B0502040204020203" pitchFamily="34" charset="0"/>
               </a:rPr>
-              <a:t>. Conheces?</a:t>
+              <a:t>?</a:t>
             </a:r>
           </a:p>
           <a:p>

</xml_diff>

<commit_message>
[LEI] começo da criação da dsl
</commit_message>
<xml_diff>
--- a/LEI/apresentações/apresLEI.pptx
+++ b/LEI/apresentações/apresLEI.pptx
@@ -216,7 +216,7 @@
           <a:p>
             <a:fld id="{06D80BC0-DB8E-4343-896B-DB141BAE3B05}" type="datetimeFigureOut">
               <a:rPr lang="pt-PT" smtClean="0"/>
-              <a:t>26/03/2019</a:t>
+              <a:t>27/03/2019</a:t>
             </a:fld>
             <a:endParaRPr lang="pt-PT"/>
           </a:p>
@@ -932,8 +932,36 @@
           <a:p>
             <a:r>
               <a:rPr lang="pt-PT" dirty="0"/>
-              <a:t>DIANA</a:t>
-            </a:r>
+              <a:t>DIANA será que vale a pena?</a:t>
+            </a:r>
+          </a:p>
+          <a:p>
+            <a:r>
+              <a:rPr lang="pt-PT" dirty="0"/>
+              <a:t>Aplicabilidade a várias áreas</a:t>
+            </a:r>
+          </a:p>
+          <a:p>
+            <a:r>
+              <a:rPr lang="pt-PT" dirty="0"/>
+              <a:t>Disponibilidade</a:t>
+            </a:r>
+          </a:p>
+          <a:p>
+            <a:r>
+              <a:rPr lang="pt-PT" dirty="0"/>
+              <a:t>Utilidade</a:t>
+            </a:r>
+          </a:p>
+          <a:p>
+            <a:r>
+              <a:rPr lang="pt-PT"/>
+              <a:t>SERVIÇOS ACADÉMICOS</a:t>
+            </a:r>
+            <a:endParaRPr lang="pt-PT" dirty="0"/>
+          </a:p>
+          <a:p>
+            <a:endParaRPr lang="pt-PT" dirty="0"/>
           </a:p>
         </p:txBody>
       </p:sp>
@@ -1679,7 +1707,7 @@
           <a:p>
             <a:fld id="{1D8BD707-D9CF-40AE-B4C6-C98DA3205C09}" type="datetimeFigureOut">
               <a:rPr lang="en-US"/>
-              <a:t>3/26/2019</a:t>
+              <a:t>3/27/2019</a:t>
             </a:fld>
             <a:endParaRPr lang="en-US"/>
           </a:p>
@@ -1850,7 +1878,7 @@
           <a:p>
             <a:fld id="{1D8BD707-D9CF-40AE-B4C6-C98DA3205C09}" type="datetimeFigureOut">
               <a:rPr lang="en-US"/>
-              <a:t>3/26/2019</a:t>
+              <a:t>3/27/2019</a:t>
             </a:fld>
             <a:endParaRPr lang="en-US"/>
           </a:p>
@@ -2290,7 +2318,7 @@
           <a:p>
             <a:fld id="{1D8BD707-D9CF-40AE-B4C6-C98DA3205C09}" type="datetimeFigureOut">
               <a:rPr lang="en-US"/>
-              <a:t>3/26/2019</a:t>
+              <a:t>3/27/2019</a:t>
             </a:fld>
             <a:endParaRPr lang="en-US"/>
           </a:p>
@@ -2496,7 +2524,7 @@
           <a:p>
             <a:fld id="{1D8BD707-D9CF-40AE-B4C6-C98DA3205C09}" type="datetimeFigureOut">
               <a:rPr lang="en-US"/>
-              <a:t>3/26/2019</a:t>
+              <a:t>3/27/2019</a:t>
             </a:fld>
             <a:endParaRPr lang="en-US"/>
           </a:p>
@@ -2615,7 +2643,7 @@
           <a:p>
             <a:fld id="{1D8BD707-D9CF-40AE-B4C6-C98DA3205C09}" type="datetimeFigureOut">
               <a:rPr lang="en-US"/>
-              <a:t>3/26/2019</a:t>
+              <a:t>3/27/2019</a:t>
             </a:fld>
             <a:endParaRPr lang="en-US"/>
           </a:p>
@@ -2834,7 +2862,7 @@
           <a:p>
             <a:fld id="{1D8BD707-D9CF-40AE-B4C6-C98DA3205C09}" type="datetimeFigureOut">
               <a:rPr lang="en-US"/>
-              <a:t>3/26/2019</a:t>
+              <a:t>3/27/2019</a:t>
             </a:fld>
             <a:endParaRPr lang="en-US"/>
           </a:p>

</xml_diff>